<commit_message>
DDP and Electronics Update
</commit_message>
<xml_diff>
--- a/High School/Design and Drawing for Production/Unit 5 - Basic Geometry in Drafting/Section 2 - Design Challenege 1/Assets/Unit 5 - Section 2 - Design Challenge 1.pptx
+++ b/High School/Design and Drawing for Production/Unit 5 - Basic Geometry in Drafting/Section 2 - Design Challenege 1/Assets/Unit 5 - Section 2 - Design Challenge 1.pptx
@@ -5,10 +5,10 @@
     <p:sldMasterId id="2147483735" r:id="rId1"/>
   </p:sldMasterIdLst>
   <p:notesMasterIdLst>
-    <p:notesMasterId r:id="rId12"/>
+    <p:notesMasterId r:id="rId13"/>
   </p:notesMasterIdLst>
   <p:handoutMasterIdLst>
-    <p:handoutMasterId r:id="rId13"/>
+    <p:handoutMasterId r:id="rId14"/>
   </p:handoutMasterIdLst>
   <p:sldIdLst>
     <p:sldId id="268" r:id="rId2"/>
@@ -21,6 +21,7 @@
     <p:sldId id="277" r:id="rId9"/>
     <p:sldId id="278" r:id="rId10"/>
     <p:sldId id="279" r:id="rId11"/>
+    <p:sldId id="280" r:id="rId12"/>
   </p:sldIdLst>
   <p:sldSz cx="12192000" cy="6858000"/>
   <p:notesSz cx="6858000" cy="9144000"/>
@@ -223,7 +224,7 @@
           <a:p>
             <a:fld id="{6AC4FB8F-ED15-48AB-97BD-17129D4E699D}" type="datetimeFigureOut">
               <a:rPr lang="en-US" smtClean="0"/>
-              <a:t>11/7/2018</a:t>
+              <a:t>11/13/2018</a:t>
             </a:fld>
             <a:endParaRPr lang="en-US" dirty="0"/>
           </a:p>
@@ -388,7 +389,7 @@
           <a:p>
             <a:fld id="{BBC9D437-CD83-4825-AD0D-5E7B341BC79B}" type="datetimeFigureOut">
               <a:rPr lang="en-US" smtClean="0"/>
-              <a:t>11/7/2018</a:t>
+              <a:t>11/13/2018</a:t>
             </a:fld>
             <a:endParaRPr lang="en-US" dirty="0"/>
           </a:p>
@@ -846,7 +847,7 @@
           <a:p>
             <a:fld id="{85AB7CBB-843F-464A-A764-71D6ADC27CFA}" type="datetime1">
               <a:rPr lang="en-US" smtClean="0"/>
-              <a:t>11/7/2018</a:t>
+              <a:t>11/13/2018</a:t>
             </a:fld>
             <a:endParaRPr lang="en-US" dirty="0"/>
           </a:p>
@@ -1299,7 +1300,7 @@
           <a:p>
             <a:fld id="{3F138946-C5C1-4A11-BA69-F12F43F8A94B}" type="datetime1">
               <a:rPr lang="en-US" smtClean="0"/>
-              <a:t>11/7/2018</a:t>
+              <a:t>11/13/2018</a:t>
             </a:fld>
             <a:endParaRPr lang="en-US" dirty="0"/>
           </a:p>
@@ -1555,7 +1556,7 @@
           <a:p>
             <a:fld id="{3F138946-C5C1-4A11-BA69-F12F43F8A94B}" type="datetime1">
               <a:rPr lang="en-US" smtClean="0"/>
-              <a:t>11/7/2018</a:t>
+              <a:t>11/13/2018</a:t>
             </a:fld>
             <a:endParaRPr lang="en-US" dirty="0"/>
           </a:p>
@@ -1869,7 +1870,7 @@
           <a:p>
             <a:fld id="{3F138946-C5C1-4A11-BA69-F12F43F8A94B}" type="datetime1">
               <a:rPr lang="en-US" smtClean="0"/>
-              <a:t>11/7/2018</a:t>
+              <a:t>11/13/2018</a:t>
             </a:fld>
             <a:endParaRPr lang="en-US" dirty="0"/>
           </a:p>
@@ -2193,7 +2194,7 @@
           <a:p>
             <a:fld id="{3F138946-C5C1-4A11-BA69-F12F43F8A94B}" type="datetime1">
               <a:rPr lang="en-US" smtClean="0"/>
-              <a:t>11/7/2018</a:t>
+              <a:t>11/13/2018</a:t>
             </a:fld>
             <a:endParaRPr lang="en-US" dirty="0"/>
           </a:p>
@@ -2501,7 +2502,7 @@
           <a:p>
             <a:fld id="{3F138946-C5C1-4A11-BA69-F12F43F8A94B}" type="datetime1">
               <a:rPr lang="en-US" smtClean="0"/>
-              <a:t>11/7/2018</a:t>
+              <a:t>11/13/2018</a:t>
             </a:fld>
             <a:endParaRPr lang="en-US" dirty="0"/>
           </a:p>
@@ -2874,7 +2875,7 @@
           <a:p>
             <a:fld id="{3F138946-C5C1-4A11-BA69-F12F43F8A94B}" type="datetime1">
               <a:rPr lang="en-US" smtClean="0"/>
-              <a:t>11/7/2018</a:t>
+              <a:t>11/13/2018</a:t>
             </a:fld>
             <a:endParaRPr lang="en-US" dirty="0"/>
           </a:p>
@@ -3054,7 +3055,7 @@
           <a:p>
             <a:fld id="{CBEFC03D-3A1F-4813-9337-02411FCC3A9A}" type="datetime1">
               <a:rPr lang="en-US" smtClean="0"/>
-              <a:t>11/7/2018</a:t>
+              <a:t>11/13/2018</a:t>
             </a:fld>
             <a:endParaRPr lang="en-US" dirty="0"/>
           </a:p>
@@ -3250,7 +3251,7 @@
           <a:p>
             <a:fld id="{3D638F79-DFA0-4C26-9553-23A017B69AB6}" type="datetime1">
               <a:rPr lang="en-US" smtClean="0"/>
-              <a:t>11/7/2018</a:t>
+              <a:t>11/13/2018</a:t>
             </a:fld>
             <a:endParaRPr lang="en-US" dirty="0"/>
           </a:p>
@@ -3361,7 +3362,7 @@
           <a:p>
             <a:fld id="{AA615CA6-EC4D-4728-8AA6-534BE7E9B67C}" type="datetime1">
               <a:rPr lang="en-US" smtClean="0"/>
-              <a:t>11/7/2018</a:t>
+              <a:t>11/13/2018</a:t>
             </a:fld>
             <a:endParaRPr lang="en-US" dirty="0"/>
           </a:p>
@@ -3546,7 +3547,7 @@
           <a:p>
             <a:fld id="{A70B34E7-E1D9-4FBF-A1A0-4009669A00BF}" type="datetime1">
               <a:rPr lang="en-US" smtClean="0"/>
-              <a:t>11/7/2018</a:t>
+              <a:t>11/13/2018</a:t>
             </a:fld>
             <a:endParaRPr lang="en-US" dirty="0"/>
           </a:p>
@@ -3813,7 +3814,7 @@
           <a:p>
             <a:fld id="{C50FD434-5945-4FAF-A8C0-DAE9905532CE}" type="datetimeFigureOut">
               <a:rPr lang="en-US" smtClean="0"/>
-              <a:t>11/7/2018</a:t>
+              <a:t>11/13/2018</a:t>
             </a:fld>
             <a:endParaRPr lang="en-US"/>
           </a:p>
@@ -4061,7 +4062,7 @@
           <a:p>
             <a:fld id="{7579E8B6-2F47-420B-83EA-EB2285D13EC9}" type="datetime1">
               <a:rPr lang="en-US" smtClean="0"/>
-              <a:t>11/7/2018</a:t>
+              <a:t>11/13/2018</a:t>
             </a:fld>
             <a:endParaRPr lang="en-US" dirty="0"/>
           </a:p>
@@ -4459,7 +4460,7 @@
           <a:p>
             <a:fld id="{2304803D-B10E-4B90-8456-A0E05393E233}" type="datetime1">
               <a:rPr lang="en-US" smtClean="0"/>
-              <a:t>11/7/2018</a:t>
+              <a:t>11/13/2018</a:t>
             </a:fld>
             <a:endParaRPr lang="en-US" dirty="0"/>
           </a:p>
@@ -4593,7 +4594,7 @@
           <a:p>
             <a:fld id="{CCE1E62F-6CCE-4064-96C2-2084AF883904}" type="datetime1">
               <a:rPr lang="en-US" smtClean="0"/>
-              <a:t>11/7/2018</a:t>
+              <a:t>11/13/2018</a:t>
             </a:fld>
             <a:endParaRPr lang="en-US" dirty="0"/>
           </a:p>
@@ -4704,7 +4705,7 @@
           <a:p>
             <a:fld id="{AA615CA6-EC4D-4728-8AA6-534BE7E9B67C}" type="datetime1">
               <a:rPr lang="en-US" smtClean="0"/>
-              <a:t>11/7/2018</a:t>
+              <a:t>11/13/2018</a:t>
             </a:fld>
             <a:endParaRPr lang="en-US" dirty="0"/>
           </a:p>
@@ -4975,7 +4976,7 @@
           <a:p>
             <a:fld id="{A6139942-0A2E-443A-842F-D6DE74360370}" type="datetime1">
               <a:rPr lang="en-US" smtClean="0"/>
-              <a:t>11/7/2018</a:t>
+              <a:t>11/13/2018</a:t>
             </a:fld>
             <a:endParaRPr lang="en-US" dirty="0"/>
           </a:p>
@@ -5274,7 +5275,7 @@
           <a:p>
             <a:fld id="{C50FD434-5945-4FAF-A8C0-DAE9905532CE}" type="datetimeFigureOut">
               <a:rPr lang="en-US" smtClean="0"/>
-              <a:t>11/7/2018</a:t>
+              <a:t>11/13/2018</a:t>
             </a:fld>
             <a:endParaRPr lang="en-US"/>
           </a:p>
@@ -5327,7 +5328,7 @@
           <p:cNvPr id="8" name="Rectangle 7">
             <a:extLst>
               <a:ext uri="{FF2B5EF4-FFF2-40B4-BE49-F238E27FC236}">
-                <a16:creationId xmlns="" xmlns:a16="http://schemas.microsoft.com/office/drawing/2014/main" id="{CEC947AC-3793-4C58-9767-D55CE5C13326}"/>
+                <a16:creationId xmlns:a16="http://schemas.microsoft.com/office/drawing/2014/main" id="{CEC947AC-3793-4C58-9767-D55CE5C13326}"/>
               </a:ext>
             </a:extLst>
           </p:cNvPr>
@@ -5744,7 +5745,7 @@
           <a:p>
             <a:fld id="{3F138946-C5C1-4A11-BA69-F12F43F8A94B}" type="datetime1">
               <a:rPr lang="en-US" smtClean="0"/>
-              <a:t>11/7/2018</a:t>
+              <a:t>11/13/2018</a:t>
             </a:fld>
             <a:endParaRPr lang="en-US" dirty="0"/>
           </a:p>
@@ -6407,45 +6408,8 @@
                   </a:schemeClr>
                 </a:solidFill>
               </a:rPr>
-              <a:t>Unit </a:t>
-            </a:r>
-            <a:r>
-              <a:rPr lang="en-US" sz="1900" dirty="0" smtClean="0">
-                <a:solidFill>
-                  <a:schemeClr val="tx1">
-                    <a:alpha val="80000"/>
-                  </a:schemeClr>
-                </a:solidFill>
-              </a:rPr>
-              <a:t>5 </a:t>
-            </a:r>
-            <a:r>
-              <a:rPr lang="en-US" sz="1900" dirty="0">
-                <a:solidFill>
-                  <a:schemeClr val="tx1">
-                    <a:alpha val="80000"/>
-                  </a:schemeClr>
-                </a:solidFill>
-              </a:rPr>
-              <a:t>– </a:t>
-            </a:r>
-            <a:r>
-              <a:rPr lang="en-US" sz="1900" dirty="0" smtClean="0">
-                <a:solidFill>
-                  <a:schemeClr val="tx1">
-                    <a:alpha val="80000"/>
-                  </a:schemeClr>
-                </a:solidFill>
-              </a:rPr>
-              <a:t>Basic Geometry</a:t>
-            </a:r>
-            <a:endParaRPr lang="en-US" sz="1900" dirty="0">
-              <a:solidFill>
-                <a:schemeClr val="tx1">
-                  <a:alpha val="80000"/>
-                </a:schemeClr>
-              </a:solidFill>
-            </a:endParaRPr>
+              <a:t>Unit 5 – Basic Geometry</a:t>
+            </a:r>
           </a:p>
           <a:p>
             <a:pPr>
@@ -6475,45 +6439,8 @@
                   </a:schemeClr>
                 </a:solidFill>
               </a:rPr>
-              <a:t>Section </a:t>
-            </a:r>
-            <a:r>
-              <a:rPr lang="en-US" sz="1900" dirty="0" smtClean="0">
-                <a:solidFill>
-                  <a:schemeClr val="tx1">
-                    <a:alpha val="80000"/>
-                  </a:schemeClr>
-                </a:solidFill>
-              </a:rPr>
-              <a:t>2 </a:t>
-            </a:r>
-            <a:r>
-              <a:rPr lang="en-US" sz="1900" dirty="0">
-                <a:solidFill>
-                  <a:schemeClr val="tx1">
-                    <a:alpha val="80000"/>
-                  </a:schemeClr>
-                </a:solidFill>
-              </a:rPr>
-              <a:t>– </a:t>
-            </a:r>
-            <a:r>
-              <a:rPr lang="en-US" sz="1900" dirty="0" smtClean="0">
-                <a:solidFill>
-                  <a:schemeClr val="tx1">
-                    <a:alpha val="80000"/>
-                  </a:schemeClr>
-                </a:solidFill>
-              </a:rPr>
-              <a:t>Design Challenge 1</a:t>
-            </a:r>
-            <a:endParaRPr lang="en-US" sz="1900" dirty="0">
-              <a:solidFill>
-                <a:schemeClr val="tx1">
-                  <a:alpha val="80000"/>
-                </a:schemeClr>
-              </a:solidFill>
-            </a:endParaRPr>
+              <a:t>Section 2 – Design Challenge 1</a:t>
+            </a:r>
           </a:p>
         </p:txBody>
       </p:sp>
@@ -6522,7 +6449,7 @@
           <p:cNvPr id="4" name="Footer Placeholder 3">
             <a:extLst>
               <a:ext uri="{FF2B5EF4-FFF2-40B4-BE49-F238E27FC236}">
-                <a16:creationId xmlns="" xmlns:a16="http://schemas.microsoft.com/office/drawing/2014/main" id="{1BD89EEB-0D82-48BB-B45A-39C4807CF951}"/>
+                <a16:creationId xmlns:a16="http://schemas.microsoft.com/office/drawing/2014/main" id="{1BD89EEB-0D82-48BB-B45A-39C4807CF951}"/>
               </a:ext>
             </a:extLst>
           </p:cNvPr>
@@ -6614,10 +6541,9 @@
           <a:lstStyle/>
           <a:p>
             <a:r>
-              <a:rPr lang="en-US" dirty="0" smtClean="0"/>
+              <a:rPr lang="en-US" dirty="0"/>
               <a:t>4 Preliminary Rough sketches</a:t>
             </a:r>
-            <a:endParaRPr lang="en-US" dirty="0"/>
           </a:p>
         </p:txBody>
       </p:sp>
@@ -6639,66 +6565,61 @@
           <a:lstStyle/>
           <a:p>
             <a:r>
-              <a:rPr lang="en-US" b="1" dirty="0" smtClean="0"/>
+              <a:rPr lang="en-US" b="1" dirty="0"/>
               <a:t>Include Title Block</a:t>
             </a:r>
           </a:p>
           <a:p>
             <a:pPr lvl="1"/>
             <a:r>
-              <a:rPr lang="en-US" b="1" dirty="0" smtClean="0"/>
+              <a:rPr lang="en-US" b="1" dirty="0"/>
               <a:t>NAME | DDP | RS # | DATE | SCALE</a:t>
             </a:r>
           </a:p>
           <a:p>
             <a:pPr lvl="1"/>
             <a:r>
-              <a:rPr lang="en-US" dirty="0" smtClean="0"/>
+              <a:rPr lang="en-US" dirty="0"/>
               <a:t>Be sure to allocate Rough Sketch drawings between group members</a:t>
             </a:r>
           </a:p>
           <a:p>
             <a:r>
-              <a:rPr lang="en-US" b="1" dirty="0" smtClean="0"/>
+              <a:rPr lang="en-US" b="1" dirty="0"/>
               <a:t>Highly detailed rough sketches</a:t>
             </a:r>
           </a:p>
           <a:p>
             <a:pPr lvl="1"/>
             <a:r>
-              <a:rPr lang="en-US" dirty="0" smtClean="0"/>
+              <a:rPr lang="en-US" dirty="0"/>
               <a:t>Arrowheads pointing to important areas</a:t>
             </a:r>
           </a:p>
           <a:p>
             <a:pPr lvl="1"/>
             <a:r>
-              <a:rPr lang="en-US" dirty="0" smtClean="0"/>
-              <a:t>Notes are lettered using a lettering guide where </a:t>
-            </a:r>
-            <a:r>
-              <a:rPr lang="en-US" dirty="0" smtClean="0"/>
-              <a:t>possible</a:t>
-            </a:r>
-          </a:p>
-          <a:p>
-            <a:r>
-              <a:rPr lang="en-US" b="1" dirty="0" smtClean="0"/>
+              <a:rPr lang="en-US" dirty="0"/>
+              <a:t>Notes are lettered using a lettering guide where possible</a:t>
+            </a:r>
+          </a:p>
+          <a:p>
+            <a:r>
+              <a:rPr lang="en-US" b="1" dirty="0"/>
               <a:t>Each additional sketch is +100 points towards your total preliminary sketch grade</a:t>
             </a:r>
           </a:p>
           <a:p>
-            <a:endParaRPr lang="en-US" b="1" dirty="0" smtClean="0"/>
+            <a:endParaRPr lang="en-US" b="1" dirty="0"/>
           </a:p>
           <a:p>
             <a:pPr marL="0" indent="0" algn="ctr">
               <a:buNone/>
             </a:pPr>
             <a:r>
-              <a:rPr lang="en-US" sz="3500" b="1" dirty="0" smtClean="0"/>
+              <a:rPr lang="en-US" sz="3500" b="1" dirty="0"/>
               <a:t>First 4 DUE FRIDAY 11/9</a:t>
             </a:r>
-            <a:endParaRPr lang="en-US" sz="3500" b="1" dirty="0" smtClean="0"/>
           </a:p>
         </p:txBody>
       </p:sp>
@@ -6718,7 +6639,7 @@
           <a:lstStyle/>
           <a:p>
             <a:r>
-              <a:rPr lang="en-US" smtClean="0"/>
+              <a:rPr lang="en-US"/>
               <a:t>Add a footer</a:t>
             </a:r>
             <a:endParaRPr lang="en-US" dirty="0"/>
@@ -6729,6 +6650,173 @@
     <p:extLst>
       <p:ext uri="{BB962C8B-B14F-4D97-AF65-F5344CB8AC3E}">
         <p14:creationId xmlns:p14="http://schemas.microsoft.com/office/powerpoint/2010/main" val="3129672362"/>
+      </p:ext>
+    </p:extLst>
+  </p:cSld>
+  <p:clrMapOvr>
+    <a:masterClrMapping/>
+  </p:clrMapOvr>
+  <mc:AlternateContent xmlns:mc="http://schemas.openxmlformats.org/markup-compatibility/2006" xmlns:p14="http://schemas.microsoft.com/office/powerpoint/2010/main">
+    <mc:Choice Requires="p14">
+      <p:transition spd="med" p14:dur="700">
+        <p:fade/>
+      </p:transition>
+    </mc:Choice>
+    <mc:Fallback xmlns="">
+      <p:transition spd="med">
+        <p:fade/>
+      </p:transition>
+    </mc:Fallback>
+  </mc:AlternateContent>
+</p:sld>
+</file>
+
+<file path=ppt/slides/slide11.xml><?xml version="1.0" encoding="utf-8"?>
+<p:sld xmlns:a="http://schemas.openxmlformats.org/drawingml/2006/main" xmlns:r="http://schemas.openxmlformats.org/officeDocument/2006/relationships" xmlns:p="http://schemas.openxmlformats.org/presentationml/2006/main">
+  <p:cSld>
+    <p:spTree>
+      <p:nvGrpSpPr>
+        <p:cNvPr id="1" name=""/>
+        <p:cNvGrpSpPr/>
+        <p:nvPr/>
+      </p:nvGrpSpPr>
+      <p:grpSpPr>
+        <a:xfrm>
+          <a:off x="0" y="0"/>
+          <a:ext cx="0" cy="0"/>
+          <a:chOff x="0" y="0"/>
+          <a:chExt cx="0" cy="0"/>
+        </a:xfrm>
+      </p:grpSpPr>
+      <p:sp>
+        <p:nvSpPr>
+          <p:cNvPr id="2" name="Title 1"/>
+          <p:cNvSpPr>
+            <a:spLocks noGrp="1"/>
+          </p:cNvSpPr>
+          <p:nvPr>
+            <p:ph type="title"/>
+          </p:nvPr>
+        </p:nvSpPr>
+        <p:spPr/>
+        <p:txBody>
+          <a:bodyPr/>
+          <a:lstStyle/>
+          <a:p>
+            <a:r>
+              <a:rPr lang="en-US" dirty="0" err="1"/>
+              <a:t>NEXt</a:t>
+            </a:r>
+            <a:r>
+              <a:rPr lang="en-US" dirty="0"/>
+              <a:t> steps</a:t>
+            </a:r>
+          </a:p>
+        </p:txBody>
+      </p:sp>
+      <p:sp>
+        <p:nvSpPr>
+          <p:cNvPr id="3" name="Content Placeholder 2"/>
+          <p:cNvSpPr>
+            <a:spLocks noGrp="1"/>
+          </p:cNvSpPr>
+          <p:nvPr>
+            <p:ph idx="1"/>
+          </p:nvPr>
+        </p:nvSpPr>
+        <p:spPr/>
+        <p:txBody>
+          <a:bodyPr>
+            <a:normAutofit/>
+          </a:bodyPr>
+          <a:lstStyle/>
+          <a:p>
+            <a:r>
+              <a:rPr lang="en-US" b="1" dirty="0"/>
+              <a:t>4 Rough Designs now completed</a:t>
+            </a:r>
+          </a:p>
+          <a:p>
+            <a:r>
+              <a:rPr lang="en-US" b="1" dirty="0"/>
+              <a:t>Begin building group PRESENTATION PORTFOLIO</a:t>
+            </a:r>
+          </a:p>
+          <a:p>
+            <a:pPr lvl="1"/>
+            <a:r>
+              <a:rPr lang="en-US" b="1" dirty="0"/>
+              <a:t>Title Page</a:t>
+            </a:r>
+          </a:p>
+          <a:p>
+            <a:pPr lvl="1"/>
+            <a:r>
+              <a:rPr lang="en-US" b="1" dirty="0"/>
+              <a:t>Introduction (Design Statement)</a:t>
+            </a:r>
+          </a:p>
+          <a:p>
+            <a:pPr lvl="1"/>
+            <a:r>
+              <a:rPr lang="en-US" b="1" dirty="0"/>
+              <a:t>Inspiration of your designs</a:t>
+            </a:r>
+          </a:p>
+          <a:p>
+            <a:pPr lvl="1"/>
+            <a:r>
+              <a:rPr lang="en-US" b="1" dirty="0"/>
+              <a:t>Thought process (how you are problem solving this challenge)</a:t>
+            </a:r>
+          </a:p>
+          <a:p>
+            <a:pPr lvl="1"/>
+            <a:r>
+              <a:rPr lang="en-US" b="1" dirty="0"/>
+              <a:t>4 Rough Sketch Designs (Be sure to talk about your designs)</a:t>
+            </a:r>
+          </a:p>
+          <a:p>
+            <a:pPr lvl="1"/>
+            <a:r>
+              <a:rPr lang="en-US" b="1" dirty="0"/>
+              <a:t>Decision Matrix</a:t>
+            </a:r>
+          </a:p>
+          <a:p>
+            <a:pPr lvl="1"/>
+            <a:endParaRPr lang="en-US" b="1" dirty="0"/>
+          </a:p>
+        </p:txBody>
+      </p:sp>
+      <p:sp>
+        <p:nvSpPr>
+          <p:cNvPr id="4" name="Footer Placeholder 3"/>
+          <p:cNvSpPr>
+            <a:spLocks noGrp="1"/>
+          </p:cNvSpPr>
+          <p:nvPr>
+            <p:ph type="ftr" sz="quarter" idx="11"/>
+          </p:nvPr>
+        </p:nvSpPr>
+        <p:spPr/>
+        <p:txBody>
+          <a:bodyPr/>
+          <a:lstStyle/>
+          <a:p>
+            <a:r>
+              <a:rPr lang="en-US"/>
+              <a:t>Add a footer</a:t>
+            </a:r>
+            <a:endParaRPr lang="en-US" dirty="0"/>
+          </a:p>
+        </p:txBody>
+      </p:sp>
+    </p:spTree>
+    <p:extLst>
+      <p:ext uri="{BB962C8B-B14F-4D97-AF65-F5344CB8AC3E}">
+        <p14:creationId xmlns:p14="http://schemas.microsoft.com/office/powerpoint/2010/main" val="3037942768"/>
       </p:ext>
     </p:extLst>
   </p:cSld>
@@ -6845,7 +6933,7 @@
           <a:lstStyle/>
           <a:p>
             <a:r>
-              <a:rPr lang="en-US" dirty="0" smtClean="0">
+              <a:rPr lang="en-US" dirty="0">
                 <a:solidFill>
                   <a:schemeClr val="tx1"/>
                 </a:solidFill>
@@ -6856,7 +6944,7 @@
           </a:p>
           <a:p>
             <a:r>
-              <a:rPr lang="en-US" dirty="0" smtClean="0">
+              <a:rPr lang="en-US" dirty="0">
                 <a:solidFill>
                   <a:schemeClr val="tx1"/>
                 </a:solidFill>
@@ -6867,7 +6955,7 @@
           </a:p>
           <a:p>
             <a:r>
-              <a:rPr lang="en-US" dirty="0" smtClean="0">
+              <a:rPr lang="en-US" dirty="0">
                 <a:solidFill>
                   <a:schemeClr val="tx1"/>
                 </a:solidFill>
@@ -6878,7 +6966,7 @@
           </a:p>
           <a:p>
             <a:r>
-              <a:rPr lang="en-US" dirty="0" smtClean="0">
+              <a:rPr lang="en-US" dirty="0">
                 <a:solidFill>
                   <a:schemeClr val="tx1"/>
                 </a:solidFill>
@@ -6902,7 +6990,7 @@
           <p:cNvPr id="4" name="Footer Placeholder 3">
             <a:extLst>
               <a:ext uri="{FF2B5EF4-FFF2-40B4-BE49-F238E27FC236}">
-                <a16:creationId xmlns="" xmlns:a16="http://schemas.microsoft.com/office/drawing/2014/main" id="{EADFB87E-2A3F-4815-8F5E-3CF3521EBF24}"/>
+                <a16:creationId xmlns:a16="http://schemas.microsoft.com/office/drawing/2014/main" id="{EADFB87E-2A3F-4815-8F5E-3CF3521EBF24}"/>
               </a:ext>
             </a:extLst>
           </p:cNvPr>
@@ -6996,10 +7084,9 @@
           <a:lstStyle/>
           <a:p>
             <a:r>
-              <a:rPr lang="en-US" dirty="0" smtClean="0"/>
+              <a:rPr lang="en-US" dirty="0"/>
               <a:t>Introduction</a:t>
             </a:r>
-            <a:endParaRPr lang="en-US" dirty="0"/>
           </a:p>
         </p:txBody>
       </p:sp>
@@ -7056,7 +7143,7 @@
           <a:lstStyle/>
           <a:p>
             <a:r>
-              <a:rPr lang="en-US" smtClean="0"/>
+              <a:rPr lang="en-US"/>
               <a:t>Add a footer</a:t>
             </a:r>
             <a:endParaRPr lang="en-US" dirty="0"/>
@@ -7121,10 +7208,9 @@
           <a:lstStyle/>
           <a:p>
             <a:r>
-              <a:rPr lang="en-US" dirty="0" smtClean="0"/>
+              <a:rPr lang="en-US" dirty="0"/>
               <a:t>Introduction</a:t>
             </a:r>
-            <a:endParaRPr lang="en-US" dirty="0"/>
           </a:p>
         </p:txBody>
       </p:sp>
@@ -7147,58 +7233,13 @@
           <a:p>
             <a:r>
               <a:rPr lang="en-US" dirty="0"/>
-              <a:t>Cargo </a:t>
-            </a:r>
-            <a:r>
-              <a:rPr lang="en-US" dirty="0" smtClean="0"/>
-              <a:t>shipping </a:t>
-            </a:r>
+              <a:t>Cargo shipping containers make great housing because they are strong, durable, waterproof, resistant to mold, fire, and termites, as well as being affordable, easy to assemble, stackable, and readily available. </a:t>
+            </a:r>
+          </a:p>
+          <a:p>
             <a:r>
               <a:rPr lang="en-US" dirty="0"/>
-              <a:t>containers make great housing because they are strong, durable, </a:t>
-            </a:r>
-            <a:r>
-              <a:rPr lang="en-US" dirty="0" smtClean="0"/>
-              <a:t>waterproof</a:t>
-            </a:r>
-            <a:r>
-              <a:rPr lang="en-US" dirty="0"/>
-              <a:t>, resistant to mold, fire, and termites, as well as being affordable, easy to </a:t>
-            </a:r>
-            <a:r>
-              <a:rPr lang="en-US" dirty="0" smtClean="0"/>
-              <a:t>assemble</a:t>
-            </a:r>
-            <a:r>
-              <a:rPr lang="en-US" dirty="0"/>
-              <a:t>, stackable, and readily available. </a:t>
-            </a:r>
-            <a:endParaRPr lang="en-US" dirty="0" smtClean="0"/>
-          </a:p>
-          <a:p>
-            <a:r>
-              <a:rPr lang="en-US" dirty="0" smtClean="0"/>
-              <a:t>Shipping </a:t>
-            </a:r>
-            <a:r>
-              <a:rPr lang="en-US" dirty="0"/>
-              <a:t>containers are in abundant </a:t>
-            </a:r>
-            <a:r>
-              <a:rPr lang="en-US" dirty="0" smtClean="0"/>
-              <a:t>supply </a:t>
-            </a:r>
-            <a:r>
-              <a:rPr lang="en-US" dirty="0"/>
-              <a:t>and many are </a:t>
-            </a:r>
-            <a:r>
-              <a:rPr lang="en-US" dirty="0" smtClean="0"/>
-              <a:t>ready </a:t>
-            </a:r>
-            <a:r>
-              <a:rPr lang="en-US" dirty="0"/>
-              <a:t>for recycling; housing is the ideal solution.</a:t>
+              <a:t>Shipping containers are in abundant supply and many are ready for recycling; housing is the ideal solution.</a:t>
             </a:r>
           </a:p>
           <a:p>
@@ -7222,7 +7263,7 @@
           <a:lstStyle/>
           <a:p>
             <a:r>
-              <a:rPr lang="en-US" smtClean="0"/>
+              <a:rPr lang="en-US"/>
               <a:t>Add a footer</a:t>
             </a:r>
             <a:endParaRPr lang="en-US" dirty="0"/>
@@ -7287,10 +7328,9 @@
           <a:lstStyle/>
           <a:p>
             <a:r>
-              <a:rPr lang="en-US" dirty="0" smtClean="0"/>
+              <a:rPr lang="en-US" dirty="0"/>
               <a:t>Constraints</a:t>
             </a:r>
-            <a:endParaRPr lang="en-US" dirty="0"/>
           </a:p>
         </p:txBody>
       </p:sp>
@@ -7311,41 +7351,13 @@
           <a:p>
             <a:r>
               <a:rPr lang="en-US" dirty="0"/>
-              <a:t>In this </a:t>
-            </a:r>
-            <a:r>
-              <a:rPr lang="en-US" dirty="0" smtClean="0"/>
-              <a:t>problem you </a:t>
-            </a:r>
+              <a:t>In this problem you will design a one-story home from four or fewer reclaimed shipping containers using your knowledge from this unit.</a:t>
+            </a:r>
+          </a:p>
+          <a:p>
             <a:r>
               <a:rPr lang="en-US" dirty="0"/>
-              <a:t>will design a one-story home from </a:t>
-            </a:r>
-            <a:r>
-              <a:rPr lang="en-US" dirty="0" smtClean="0"/>
-              <a:t>four or fewer reclaimed </a:t>
-            </a:r>
-            <a:r>
-              <a:rPr lang="en-US" dirty="0"/>
-              <a:t>shipping containers using your knowledge from this </a:t>
-            </a:r>
-            <a:r>
-              <a:rPr lang="en-US" dirty="0" smtClean="0"/>
-              <a:t>unit.</a:t>
-            </a:r>
-          </a:p>
-          <a:p>
-            <a:r>
-              <a:rPr lang="en-US" dirty="0" smtClean="0"/>
-              <a:t>Consider </a:t>
-            </a:r>
-            <a:r>
-              <a:rPr lang="en-US" dirty="0"/>
-              <a:t>factors like room sizes and relationships, kitchen working triangle, and plumbing configurations</a:t>
-            </a:r>
-            <a:r>
-              <a:rPr lang="en-US" dirty="0" smtClean="0"/>
-              <a:t>.</a:t>
+              <a:t>Consider factors like room sizes and relationships, kitchen working triangle, and plumbing configurations.</a:t>
             </a:r>
           </a:p>
           <a:p>
@@ -7374,22 +7386,17 @@
               <a:t>two-bedroom</a:t>
             </a:r>
             <a:r>
-              <a:rPr lang="en-US" dirty="0" smtClean="0"/>
+              <a:rPr lang="en-US" dirty="0"/>
               <a:t>, and </a:t>
             </a:r>
             <a:r>
               <a:rPr lang="en-US" b="1" dirty="0"/>
-              <a:t>1 or 1½ </a:t>
-            </a:r>
-            <a:r>
-              <a:rPr lang="en-US" b="1" dirty="0" smtClean="0"/>
-              <a:t>bathroom </a:t>
-            </a:r>
-            <a:r>
-              <a:rPr lang="en-US" dirty="0" smtClean="0"/>
+              <a:t>1 or 1½ bathroom </a:t>
+            </a:r>
+            <a:r>
+              <a:rPr lang="en-US" dirty="0"/>
               <a:t>home</a:t>
             </a:r>
-            <a:endParaRPr lang="en-US" dirty="0"/>
           </a:p>
         </p:txBody>
       </p:sp>
@@ -7409,7 +7416,7 @@
           <a:lstStyle/>
           <a:p>
             <a:r>
-              <a:rPr lang="en-US" smtClean="0"/>
+              <a:rPr lang="en-US"/>
               <a:t>Add a footer</a:t>
             </a:r>
             <a:endParaRPr lang="en-US" dirty="0"/>
@@ -7474,7 +7481,7 @@
           <a:lstStyle/>
           <a:p>
             <a:r>
-              <a:rPr lang="en-US" smtClean="0"/>
+              <a:rPr lang="en-US"/>
               <a:t>Add a footer</a:t>
             </a:r>
             <a:endParaRPr lang="en-US" dirty="0"/>
@@ -7580,7 +7587,7 @@
           <a:lstStyle/>
           <a:p>
             <a:r>
-              <a:rPr lang="en-US" smtClean="0"/>
+              <a:rPr lang="en-US"/>
               <a:t>Add a footer</a:t>
             </a:r>
             <a:endParaRPr lang="en-US" dirty="0"/>
@@ -7686,10 +7693,9 @@
           <a:lstStyle/>
           <a:p>
             <a:r>
-              <a:rPr lang="en-US" dirty="0" smtClean="0"/>
+              <a:rPr lang="en-US" dirty="0"/>
               <a:t>Group assignments</a:t>
             </a:r>
-            <a:endParaRPr lang="en-US" dirty="0"/>
           </a:p>
         </p:txBody>
       </p:sp>
@@ -7709,13 +7715,13 @@
           <a:lstStyle/>
           <a:p>
             <a:r>
-              <a:rPr lang="en-US" dirty="0" smtClean="0"/>
+              <a:rPr lang="en-US" dirty="0"/>
               <a:t>Groups will need to be organized into groups of 4</a:t>
             </a:r>
           </a:p>
           <a:p>
             <a:r>
-              <a:rPr lang="en-US" dirty="0" smtClean="0"/>
+              <a:rPr lang="en-US" dirty="0"/>
               <a:t>Assignments to be completed via Google Classroom are:</a:t>
             </a:r>
           </a:p>
@@ -7725,7 +7731,7 @@
               <a:buAutoNum type="arabicPeriod"/>
             </a:pPr>
             <a:r>
-              <a:rPr lang="en-US" dirty="0" smtClean="0"/>
+              <a:rPr lang="en-US" dirty="0"/>
               <a:t>Shipping Container templates</a:t>
             </a:r>
           </a:p>
@@ -7735,14 +7741,14 @@
               <a:buAutoNum type="arabicPeriod"/>
             </a:pPr>
             <a:r>
-              <a:rPr lang="en-US" dirty="0" smtClean="0"/>
+              <a:rPr lang="en-US" dirty="0"/>
               <a:t>4 preliminary rough sketches</a:t>
             </a:r>
           </a:p>
           <a:p>
             <a:pPr lvl="2"/>
             <a:r>
-              <a:rPr lang="en-US" dirty="0" smtClean="0"/>
+              <a:rPr lang="en-US" dirty="0"/>
               <a:t>More designs equal more points</a:t>
             </a:r>
           </a:p>
@@ -7752,7 +7758,7 @@
               <a:buAutoNum type="arabicPeriod"/>
             </a:pPr>
             <a:r>
-              <a:rPr lang="en-US" dirty="0" smtClean="0"/>
+              <a:rPr lang="en-US" dirty="0"/>
               <a:t>Design statement document</a:t>
             </a:r>
           </a:p>
@@ -7762,7 +7768,7 @@
               <a:buAutoNum type="arabicPeriod"/>
             </a:pPr>
             <a:r>
-              <a:rPr lang="en-US" dirty="0" smtClean="0"/>
+              <a:rPr lang="en-US" dirty="0"/>
               <a:t>Research document</a:t>
             </a:r>
           </a:p>
@@ -7788,7 +7794,7 @@
           <a:lstStyle/>
           <a:p>
             <a:r>
-              <a:rPr lang="en-US" smtClean="0"/>
+              <a:rPr lang="en-US"/>
               <a:t>Add a footer</a:t>
             </a:r>
             <a:endParaRPr lang="en-US" dirty="0"/>
@@ -7853,10 +7859,9 @@
           <a:lstStyle/>
           <a:p>
             <a:r>
-              <a:rPr lang="en-US" dirty="0" smtClean="0"/>
+              <a:rPr lang="en-US" dirty="0"/>
               <a:t>4 Preliminary Rough sketches</a:t>
             </a:r>
-            <a:endParaRPr lang="en-US" dirty="0"/>
           </a:p>
         </p:txBody>
       </p:sp>
@@ -7878,68 +7883,68 @@
           <a:lstStyle/>
           <a:p>
             <a:r>
-              <a:rPr lang="en-US" dirty="0" smtClean="0"/>
+              <a:rPr lang="en-US" dirty="0"/>
               <a:t>Include Title Block</a:t>
             </a:r>
           </a:p>
           <a:p>
             <a:pPr lvl="1"/>
             <a:r>
-              <a:rPr lang="en-US" dirty="0" smtClean="0"/>
+              <a:rPr lang="en-US" dirty="0"/>
               <a:t>NAME | DDP | RS # | DATE | SCALE</a:t>
             </a:r>
           </a:p>
           <a:p>
             <a:pPr lvl="1"/>
             <a:r>
-              <a:rPr lang="en-US" dirty="0" smtClean="0"/>
+              <a:rPr lang="en-US" dirty="0"/>
               <a:t>Be sure to allocate Rough Sketch drawings between group members</a:t>
             </a:r>
           </a:p>
           <a:p>
             <a:r>
-              <a:rPr lang="en-US" dirty="0" smtClean="0"/>
+              <a:rPr lang="en-US" dirty="0"/>
               <a:t>Highly detailed rough sketches</a:t>
             </a:r>
           </a:p>
           <a:p>
             <a:pPr lvl="1"/>
             <a:r>
-              <a:rPr lang="en-US" dirty="0" smtClean="0"/>
+              <a:rPr lang="en-US" dirty="0"/>
               <a:t>Arrowheads pointing to important areas</a:t>
             </a:r>
           </a:p>
           <a:p>
             <a:pPr lvl="1"/>
             <a:r>
-              <a:rPr lang="en-US" dirty="0" smtClean="0"/>
+              <a:rPr lang="en-US" dirty="0"/>
               <a:t>Notes are lettered using a lettering guide where possible</a:t>
             </a:r>
           </a:p>
           <a:p>
             <a:r>
-              <a:rPr lang="en-US" dirty="0" smtClean="0"/>
+              <a:rPr lang="en-US" dirty="0"/>
               <a:t>Your groups portfolio / presentation should be started</a:t>
             </a:r>
           </a:p>
           <a:p>
             <a:pPr lvl="1"/>
             <a:r>
-              <a:rPr lang="en-US" dirty="0" smtClean="0"/>
+              <a:rPr lang="en-US" dirty="0"/>
               <a:t>Include images of sketches and designs</a:t>
             </a:r>
           </a:p>
           <a:p>
             <a:pPr lvl="1"/>
             <a:r>
-              <a:rPr lang="en-US" dirty="0" smtClean="0"/>
+              <a:rPr lang="en-US" dirty="0"/>
               <a:t>Include discussion or talking points your group had</a:t>
             </a:r>
           </a:p>
           <a:p>
             <a:pPr lvl="1"/>
             <a:r>
-              <a:rPr lang="en-US" dirty="0" smtClean="0"/>
+              <a:rPr lang="en-US" dirty="0"/>
               <a:t>Outline your groups design process</a:t>
             </a:r>
           </a:p>
@@ -7961,7 +7966,7 @@
           <a:lstStyle/>
           <a:p>
             <a:r>
-              <a:rPr lang="en-US" smtClean="0"/>
+              <a:rPr lang="en-US"/>
               <a:t>Add a footer</a:t>
             </a:r>
             <a:endParaRPr lang="en-US" dirty="0"/>

</xml_diff>

<commit_message>
Series Circuit Voltage Drop Quiz
</commit_message>
<xml_diff>
--- a/High School/Design and Drawing for Production/Unit 5 - Basic Geometry in Drafting/Section 2 - Design Challenege 1/Assets/Unit 5 - Section 2 - Design Challenge 1.pptx
+++ b/High School/Design and Drawing for Production/Unit 5 - Basic Geometry in Drafting/Section 2 - Design Challenege 1/Assets/Unit 5 - Section 2 - Design Challenge 1.pptx
@@ -224,7 +224,7 @@
           <a:p>
             <a:fld id="{6AC4FB8F-ED15-48AB-97BD-17129D4E699D}" type="datetimeFigureOut">
               <a:rPr lang="en-US" smtClean="0"/>
-              <a:t>11/13/2018</a:t>
+              <a:t>11/16/2018</a:t>
             </a:fld>
             <a:endParaRPr lang="en-US" dirty="0"/>
           </a:p>
@@ -389,7 +389,7 @@
           <a:p>
             <a:fld id="{BBC9D437-CD83-4825-AD0D-5E7B341BC79B}" type="datetimeFigureOut">
               <a:rPr lang="en-US" smtClean="0"/>
-              <a:t>11/13/2018</a:t>
+              <a:t>11/16/2018</a:t>
             </a:fld>
             <a:endParaRPr lang="en-US" dirty="0"/>
           </a:p>
@@ -847,7 +847,7 @@
           <a:p>
             <a:fld id="{85AB7CBB-843F-464A-A764-71D6ADC27CFA}" type="datetime1">
               <a:rPr lang="en-US" smtClean="0"/>
-              <a:t>11/13/2018</a:t>
+              <a:t>11/16/2018</a:t>
             </a:fld>
             <a:endParaRPr lang="en-US" dirty="0"/>
           </a:p>
@@ -1300,7 +1300,7 @@
           <a:p>
             <a:fld id="{3F138946-C5C1-4A11-BA69-F12F43F8A94B}" type="datetime1">
               <a:rPr lang="en-US" smtClean="0"/>
-              <a:t>11/13/2018</a:t>
+              <a:t>11/16/2018</a:t>
             </a:fld>
             <a:endParaRPr lang="en-US" dirty="0"/>
           </a:p>
@@ -1556,7 +1556,7 @@
           <a:p>
             <a:fld id="{3F138946-C5C1-4A11-BA69-F12F43F8A94B}" type="datetime1">
               <a:rPr lang="en-US" smtClean="0"/>
-              <a:t>11/13/2018</a:t>
+              <a:t>11/16/2018</a:t>
             </a:fld>
             <a:endParaRPr lang="en-US" dirty="0"/>
           </a:p>
@@ -1870,7 +1870,7 @@
           <a:p>
             <a:fld id="{3F138946-C5C1-4A11-BA69-F12F43F8A94B}" type="datetime1">
               <a:rPr lang="en-US" smtClean="0"/>
-              <a:t>11/13/2018</a:t>
+              <a:t>11/16/2018</a:t>
             </a:fld>
             <a:endParaRPr lang="en-US" dirty="0"/>
           </a:p>
@@ -2194,7 +2194,7 @@
           <a:p>
             <a:fld id="{3F138946-C5C1-4A11-BA69-F12F43F8A94B}" type="datetime1">
               <a:rPr lang="en-US" smtClean="0"/>
-              <a:t>11/13/2018</a:t>
+              <a:t>11/16/2018</a:t>
             </a:fld>
             <a:endParaRPr lang="en-US" dirty="0"/>
           </a:p>
@@ -2502,7 +2502,7 @@
           <a:p>
             <a:fld id="{3F138946-C5C1-4A11-BA69-F12F43F8A94B}" type="datetime1">
               <a:rPr lang="en-US" smtClean="0"/>
-              <a:t>11/13/2018</a:t>
+              <a:t>11/16/2018</a:t>
             </a:fld>
             <a:endParaRPr lang="en-US" dirty="0"/>
           </a:p>
@@ -2875,7 +2875,7 @@
           <a:p>
             <a:fld id="{3F138946-C5C1-4A11-BA69-F12F43F8A94B}" type="datetime1">
               <a:rPr lang="en-US" smtClean="0"/>
-              <a:t>11/13/2018</a:t>
+              <a:t>11/16/2018</a:t>
             </a:fld>
             <a:endParaRPr lang="en-US" dirty="0"/>
           </a:p>
@@ -3055,7 +3055,7 @@
           <a:p>
             <a:fld id="{CBEFC03D-3A1F-4813-9337-02411FCC3A9A}" type="datetime1">
               <a:rPr lang="en-US" smtClean="0"/>
-              <a:t>11/13/2018</a:t>
+              <a:t>11/16/2018</a:t>
             </a:fld>
             <a:endParaRPr lang="en-US" dirty="0"/>
           </a:p>
@@ -3251,7 +3251,7 @@
           <a:p>
             <a:fld id="{3D638F79-DFA0-4C26-9553-23A017B69AB6}" type="datetime1">
               <a:rPr lang="en-US" smtClean="0"/>
-              <a:t>11/13/2018</a:t>
+              <a:t>11/16/2018</a:t>
             </a:fld>
             <a:endParaRPr lang="en-US" dirty="0"/>
           </a:p>
@@ -3362,7 +3362,7 @@
           <a:p>
             <a:fld id="{AA615CA6-EC4D-4728-8AA6-534BE7E9B67C}" type="datetime1">
               <a:rPr lang="en-US" smtClean="0"/>
-              <a:t>11/13/2018</a:t>
+              <a:t>11/16/2018</a:t>
             </a:fld>
             <a:endParaRPr lang="en-US" dirty="0"/>
           </a:p>
@@ -3547,7 +3547,7 @@
           <a:p>
             <a:fld id="{A70B34E7-E1D9-4FBF-A1A0-4009669A00BF}" type="datetime1">
               <a:rPr lang="en-US" smtClean="0"/>
-              <a:t>11/13/2018</a:t>
+              <a:t>11/16/2018</a:t>
             </a:fld>
             <a:endParaRPr lang="en-US" dirty="0"/>
           </a:p>
@@ -3814,7 +3814,7 @@
           <a:p>
             <a:fld id="{C50FD434-5945-4FAF-A8C0-DAE9905532CE}" type="datetimeFigureOut">
               <a:rPr lang="en-US" smtClean="0"/>
-              <a:t>11/13/2018</a:t>
+              <a:t>11/16/2018</a:t>
             </a:fld>
             <a:endParaRPr lang="en-US"/>
           </a:p>
@@ -4062,7 +4062,7 @@
           <a:p>
             <a:fld id="{7579E8B6-2F47-420B-83EA-EB2285D13EC9}" type="datetime1">
               <a:rPr lang="en-US" smtClean="0"/>
-              <a:t>11/13/2018</a:t>
+              <a:t>11/16/2018</a:t>
             </a:fld>
             <a:endParaRPr lang="en-US" dirty="0"/>
           </a:p>
@@ -4460,7 +4460,7 @@
           <a:p>
             <a:fld id="{2304803D-B10E-4B90-8456-A0E05393E233}" type="datetime1">
               <a:rPr lang="en-US" smtClean="0"/>
-              <a:t>11/13/2018</a:t>
+              <a:t>11/16/2018</a:t>
             </a:fld>
             <a:endParaRPr lang="en-US" dirty="0"/>
           </a:p>
@@ -4594,7 +4594,7 @@
           <a:p>
             <a:fld id="{CCE1E62F-6CCE-4064-96C2-2084AF883904}" type="datetime1">
               <a:rPr lang="en-US" smtClean="0"/>
-              <a:t>11/13/2018</a:t>
+              <a:t>11/16/2018</a:t>
             </a:fld>
             <a:endParaRPr lang="en-US" dirty="0"/>
           </a:p>
@@ -4705,7 +4705,7 @@
           <a:p>
             <a:fld id="{AA615CA6-EC4D-4728-8AA6-534BE7E9B67C}" type="datetime1">
               <a:rPr lang="en-US" smtClean="0"/>
-              <a:t>11/13/2018</a:t>
+              <a:t>11/16/2018</a:t>
             </a:fld>
             <a:endParaRPr lang="en-US" dirty="0"/>
           </a:p>
@@ -4976,7 +4976,7 @@
           <a:p>
             <a:fld id="{A6139942-0A2E-443A-842F-D6DE74360370}" type="datetime1">
               <a:rPr lang="en-US" smtClean="0"/>
-              <a:t>11/13/2018</a:t>
+              <a:t>11/16/2018</a:t>
             </a:fld>
             <a:endParaRPr lang="en-US" dirty="0"/>
           </a:p>
@@ -5275,7 +5275,7 @@
           <a:p>
             <a:fld id="{C50FD434-5945-4FAF-A8C0-DAE9905532CE}" type="datetimeFigureOut">
               <a:rPr lang="en-US" smtClean="0"/>
-              <a:t>11/13/2018</a:t>
+              <a:t>11/16/2018</a:t>
             </a:fld>
             <a:endParaRPr lang="en-US"/>
           </a:p>
@@ -5328,7 +5328,7 @@
           <p:cNvPr id="8" name="Rectangle 7">
             <a:extLst>
               <a:ext uri="{FF2B5EF4-FFF2-40B4-BE49-F238E27FC236}">
-                <a16:creationId xmlns:a16="http://schemas.microsoft.com/office/drawing/2014/main" id="{CEC947AC-3793-4C58-9767-D55CE5C13326}"/>
+                <a16:creationId xmlns:a16="http://schemas.microsoft.com/office/drawing/2014/main" xmlns="" id="{CEC947AC-3793-4C58-9767-D55CE5C13326}"/>
               </a:ext>
             </a:extLst>
           </p:cNvPr>
@@ -5745,7 +5745,7 @@
           <a:p>
             <a:fld id="{3F138946-C5C1-4A11-BA69-F12F43F8A94B}" type="datetime1">
               <a:rPr lang="en-US" smtClean="0"/>
-              <a:t>11/13/2018</a:t>
+              <a:t>11/16/2018</a:t>
             </a:fld>
             <a:endParaRPr lang="en-US" dirty="0"/>
           </a:p>
@@ -6449,7 +6449,7 @@
           <p:cNvPr id="4" name="Footer Placeholder 3">
             <a:extLst>
               <a:ext uri="{FF2B5EF4-FFF2-40B4-BE49-F238E27FC236}">
-                <a16:creationId xmlns:a16="http://schemas.microsoft.com/office/drawing/2014/main" id="{1BD89EEB-0D82-48BB-B45A-39C4807CF951}"/>
+                <a16:creationId xmlns:a16="http://schemas.microsoft.com/office/drawing/2014/main" xmlns="" id="{1BD89EEB-0D82-48BB-B45A-39C4807CF951}"/>
               </a:ext>
             </a:extLst>
           </p:cNvPr>
@@ -6990,7 +6990,7 @@
           <p:cNvPr id="4" name="Footer Placeholder 3">
             <a:extLst>
               <a:ext uri="{FF2B5EF4-FFF2-40B4-BE49-F238E27FC236}">
-                <a16:creationId xmlns:a16="http://schemas.microsoft.com/office/drawing/2014/main" id="{EADFB87E-2A3F-4815-8F5E-3CF3521EBF24}"/>
+                <a16:creationId xmlns:a16="http://schemas.microsoft.com/office/drawing/2014/main" xmlns="" id="{EADFB87E-2A3F-4815-8F5E-3CF3521EBF24}"/>
               </a:ext>
             </a:extLst>
           </p:cNvPr>

</xml_diff>